<commit_message>
Various pages added and content lifted from blog.
</commit_message>
<xml_diff>
--- a/docs/Images.pptx
+++ b/docs/Images.pptx
@@ -104,6 +104,11 @@
       </a:defRPr>
     </a:lvl9pPr>
   </p:defaultTextStyle>
+  <p:extLst>
+    <p:ext uri="{EFAFB233-063F-42B5-8137-9DF3F51BA10A}">
+      <p15:sldGuideLst xmlns:p15="http://schemas.microsoft.com/office/powerpoint/2012/main"/>
+    </p:ext>
+  </p:extLst>
 </p:presentation>
 </file>
 
@@ -3672,6 +3677,96 @@
           </a:prstGeom>
         </p:spPr>
       </p:pic>
+      <p:pic>
+        <p:nvPicPr>
+          <p:cNvPr id="3" name="Picture 2">
+            <a:extLst>
+              <a:ext uri="{FF2B5EF4-FFF2-40B4-BE49-F238E27FC236}">
+                <a16:creationId xmlns:a16="http://schemas.microsoft.com/office/drawing/2014/main" id="{3D8146D3-54B8-4375-B496-FCDDB202865F}"/>
+              </a:ext>
+            </a:extLst>
+          </p:cNvPr>
+          <p:cNvPicPr>
+            <a:picLocks noChangeAspect="1"/>
+          </p:cNvPicPr>
+          <p:nvPr/>
+        </p:nvPicPr>
+        <p:blipFill>
+          <a:blip r:embed="rId13"/>
+          <a:stretch>
+            <a:fillRect/>
+          </a:stretch>
+        </p:blipFill>
+        <p:spPr>
+          <a:xfrm>
+            <a:off x="2093962" y="1564808"/>
+            <a:ext cx="754702" cy="754702"/>
+          </a:xfrm>
+          <a:prstGeom prst="rect">
+            <a:avLst/>
+          </a:prstGeom>
+        </p:spPr>
+      </p:pic>
+      <p:pic>
+        <p:nvPicPr>
+          <p:cNvPr id="6" name="Picture 5">
+            <a:extLst>
+              <a:ext uri="{FF2B5EF4-FFF2-40B4-BE49-F238E27FC236}">
+                <a16:creationId xmlns:a16="http://schemas.microsoft.com/office/drawing/2014/main" id="{71F09F55-F515-40A4-BD53-1A4C62A37974}"/>
+              </a:ext>
+            </a:extLst>
+          </p:cNvPr>
+          <p:cNvPicPr>
+            <a:picLocks noChangeAspect="1"/>
+          </p:cNvPicPr>
+          <p:nvPr/>
+        </p:nvPicPr>
+        <p:blipFill>
+          <a:blip r:embed="rId14"/>
+          <a:stretch>
+            <a:fillRect/>
+          </a:stretch>
+        </p:blipFill>
+        <p:spPr>
+          <a:xfrm>
+            <a:off x="2703489" y="1564807"/>
+            <a:ext cx="754702" cy="754702"/>
+          </a:xfrm>
+          <a:prstGeom prst="rect">
+            <a:avLst/>
+          </a:prstGeom>
+        </p:spPr>
+      </p:pic>
+      <p:pic>
+        <p:nvPicPr>
+          <p:cNvPr id="8" name="Picture 7">
+            <a:extLst>
+              <a:ext uri="{FF2B5EF4-FFF2-40B4-BE49-F238E27FC236}">
+                <a16:creationId xmlns:a16="http://schemas.microsoft.com/office/drawing/2014/main" id="{153C544E-5D18-4623-8615-A2E894CE84EC}"/>
+              </a:ext>
+            </a:extLst>
+          </p:cNvPr>
+          <p:cNvPicPr>
+            <a:picLocks noChangeAspect="1"/>
+          </p:cNvPicPr>
+          <p:nvPr/>
+        </p:nvPicPr>
+        <p:blipFill>
+          <a:blip r:embed="rId15"/>
+          <a:stretch>
+            <a:fillRect/>
+          </a:stretch>
+        </p:blipFill>
+        <p:spPr>
+          <a:xfrm>
+            <a:off x="3811781" y="1562356"/>
+            <a:ext cx="579474" cy="761369"/>
+          </a:xfrm>
+          <a:prstGeom prst="rect">
+            <a:avLst/>
+          </a:prstGeom>
+        </p:spPr>
+      </p:pic>
     </p:spTree>
     <p:extLst>
       <p:ext uri="{BB962C8B-B14F-4D97-AF65-F5344CB8AC3E}">

</xml_diff>

<commit_message>
Images added to solution file
</commit_message>
<xml_diff>
--- a/docs/Images.pptx
+++ b/docs/Images.pptx
@@ -3602,6 +3602,66 @@
           </a:prstGeom>
         </p:spPr>
       </p:pic>
+      <p:pic>
+        <p:nvPicPr>
+          <p:cNvPr id="2" name="Picture 1">
+            <a:extLst>
+              <a:ext uri="{FF2B5EF4-FFF2-40B4-BE49-F238E27FC236}">
+                <a16:creationId xmlns:a16="http://schemas.microsoft.com/office/drawing/2014/main" id="{7EBD7E6F-AEA8-42C6-962B-070460894540}"/>
+              </a:ext>
+            </a:extLst>
+          </p:cNvPr>
+          <p:cNvPicPr>
+            <a:picLocks noChangeAspect="1"/>
+          </p:cNvPicPr>
+          <p:nvPr/>
+        </p:nvPicPr>
+        <p:blipFill>
+          <a:blip r:embed="rId23"/>
+          <a:stretch>
+            <a:fillRect/>
+          </a:stretch>
+        </p:blipFill>
+        <p:spPr>
+          <a:xfrm>
+            <a:off x="7692856" y="1629342"/>
+            <a:ext cx="756997" cy="758918"/>
+          </a:xfrm>
+          <a:prstGeom prst="rect">
+            <a:avLst/>
+          </a:prstGeom>
+        </p:spPr>
+      </p:pic>
+      <p:pic>
+        <p:nvPicPr>
+          <p:cNvPr id="10" name="Picture 9">
+            <a:extLst>
+              <a:ext uri="{FF2B5EF4-FFF2-40B4-BE49-F238E27FC236}">
+                <a16:creationId xmlns:a16="http://schemas.microsoft.com/office/drawing/2014/main" id="{D6EDCFB4-164B-4606-B622-EA42AF4FFB09}"/>
+              </a:ext>
+            </a:extLst>
+          </p:cNvPr>
+          <p:cNvPicPr>
+            <a:picLocks noChangeAspect="1"/>
+          </p:cNvPicPr>
+          <p:nvPr/>
+        </p:nvPicPr>
+        <p:blipFill>
+          <a:blip r:embed="rId24"/>
+          <a:stretch>
+            <a:fillRect/>
+          </a:stretch>
+        </p:blipFill>
+        <p:spPr>
+          <a:xfrm>
+            <a:off x="8933301" y="1624784"/>
+            <a:ext cx="765633" cy="761368"/>
+          </a:xfrm>
+          <a:prstGeom prst="rect">
+            <a:avLst/>
+          </a:prstGeom>
+        </p:spPr>
+      </p:pic>
     </p:spTree>
     <p:extLst>
       <p:ext uri="{BB962C8B-B14F-4D97-AF65-F5344CB8AC3E}">
@@ -3632,6 +3692,36 @@
           <a:chExt cx="0" cy="0"/>
         </a:xfrm>
       </p:grpSpPr>
+      <p:pic>
+        <p:nvPicPr>
+          <p:cNvPr id="3" name="Picture 2">
+            <a:extLst>
+              <a:ext uri="{FF2B5EF4-FFF2-40B4-BE49-F238E27FC236}">
+                <a16:creationId xmlns:a16="http://schemas.microsoft.com/office/drawing/2014/main" id="{4DC4C5B7-9CF6-4697-847D-3B687E8EECCD}"/>
+              </a:ext>
+            </a:extLst>
+          </p:cNvPr>
+          <p:cNvPicPr>
+            <a:picLocks noChangeAspect="1"/>
+          </p:cNvPicPr>
+          <p:nvPr/>
+        </p:nvPicPr>
+        <p:blipFill>
+          <a:blip r:embed="rId2"/>
+          <a:stretch>
+            <a:fillRect/>
+          </a:stretch>
+        </p:blipFill>
+        <p:spPr>
+          <a:xfrm>
+            <a:off x="424072" y="298242"/>
+            <a:ext cx="10944225" cy="6238875"/>
+          </a:xfrm>
+          <a:prstGeom prst="rect">
+            <a:avLst/>
+          </a:prstGeom>
+        </p:spPr>
+      </p:pic>
     </p:spTree>
     <p:extLst>
       <p:ext uri="{BB962C8B-B14F-4D97-AF65-F5344CB8AC3E}">

</xml_diff>

<commit_message>
v2.0 documentation overhaul #95
</commit_message>
<xml_diff>
--- a/docs/Images.pptx
+++ b/docs/Images.pptx
@@ -7,6 +7,7 @@
   <p:sldIdLst>
     <p:sldId id="256" r:id="rId2"/>
     <p:sldId id="257" r:id="rId3"/>
+    <p:sldId id="258" r:id="rId4"/>
   </p:sldIdLst>
   <p:sldSz cx="18000663" cy="18000663"/>
   <p:notesSz cx="6858000" cy="9144000"/>
@@ -244,7 +245,7 @@
           <a:p>
             <a:fld id="{9B1FE331-607A-41C5-B1B0-1D41A3BD8DBC}" type="datetimeFigureOut">
               <a:rPr lang="en-GB" smtClean="0"/>
-              <a:t>22/09/2020</a:t>
+              <a:t>17/12/2020</a:t>
             </a:fld>
             <a:endParaRPr lang="en-GB"/>
           </a:p>
@@ -414,7 +415,7 @@
           <a:p>
             <a:fld id="{9B1FE331-607A-41C5-B1B0-1D41A3BD8DBC}" type="datetimeFigureOut">
               <a:rPr lang="en-GB" smtClean="0"/>
-              <a:t>22/09/2020</a:t>
+              <a:t>17/12/2020</a:t>
             </a:fld>
             <a:endParaRPr lang="en-GB"/>
           </a:p>
@@ -594,7 +595,7 @@
           <a:p>
             <a:fld id="{9B1FE331-607A-41C5-B1B0-1D41A3BD8DBC}" type="datetimeFigureOut">
               <a:rPr lang="en-GB" smtClean="0"/>
-              <a:t>22/09/2020</a:t>
+              <a:t>17/12/2020</a:t>
             </a:fld>
             <a:endParaRPr lang="en-GB"/>
           </a:p>
@@ -764,7 +765,7 @@
           <a:p>
             <a:fld id="{9B1FE331-607A-41C5-B1B0-1D41A3BD8DBC}" type="datetimeFigureOut">
               <a:rPr lang="en-GB" smtClean="0"/>
-              <a:t>22/09/2020</a:t>
+              <a:t>17/12/2020</a:t>
             </a:fld>
             <a:endParaRPr lang="en-GB"/>
           </a:p>
@@ -1008,7 +1009,7 @@
           <a:p>
             <a:fld id="{9B1FE331-607A-41C5-B1B0-1D41A3BD8DBC}" type="datetimeFigureOut">
               <a:rPr lang="en-GB" smtClean="0"/>
-              <a:t>22/09/2020</a:t>
+              <a:t>17/12/2020</a:t>
             </a:fld>
             <a:endParaRPr lang="en-GB"/>
           </a:p>
@@ -1240,7 +1241,7 @@
           <a:p>
             <a:fld id="{9B1FE331-607A-41C5-B1B0-1D41A3BD8DBC}" type="datetimeFigureOut">
               <a:rPr lang="en-GB" smtClean="0"/>
-              <a:t>22/09/2020</a:t>
+              <a:t>17/12/2020</a:t>
             </a:fld>
             <a:endParaRPr lang="en-GB"/>
           </a:p>
@@ -1607,7 +1608,7 @@
           <a:p>
             <a:fld id="{9B1FE331-607A-41C5-B1B0-1D41A3BD8DBC}" type="datetimeFigureOut">
               <a:rPr lang="en-GB" smtClean="0"/>
-              <a:t>22/09/2020</a:t>
+              <a:t>17/12/2020</a:t>
             </a:fld>
             <a:endParaRPr lang="en-GB"/>
           </a:p>
@@ -1725,7 +1726,7 @@
           <a:p>
             <a:fld id="{9B1FE331-607A-41C5-B1B0-1D41A3BD8DBC}" type="datetimeFigureOut">
               <a:rPr lang="en-GB" smtClean="0"/>
-              <a:t>22/09/2020</a:t>
+              <a:t>17/12/2020</a:t>
             </a:fld>
             <a:endParaRPr lang="en-GB"/>
           </a:p>
@@ -1820,7 +1821,7 @@
           <a:p>
             <a:fld id="{9B1FE331-607A-41C5-B1B0-1D41A3BD8DBC}" type="datetimeFigureOut">
               <a:rPr lang="en-GB" smtClean="0"/>
-              <a:t>22/09/2020</a:t>
+              <a:t>17/12/2020</a:t>
             </a:fld>
             <a:endParaRPr lang="en-GB"/>
           </a:p>
@@ -2097,7 +2098,7 @@
           <a:p>
             <a:fld id="{9B1FE331-607A-41C5-B1B0-1D41A3BD8DBC}" type="datetimeFigureOut">
               <a:rPr lang="en-GB" smtClean="0"/>
-              <a:t>22/09/2020</a:t>
+              <a:t>17/12/2020</a:t>
             </a:fld>
             <a:endParaRPr lang="en-GB"/>
           </a:p>
@@ -2354,7 +2355,7 @@
           <a:p>
             <a:fld id="{9B1FE331-607A-41C5-B1B0-1D41A3BD8DBC}" type="datetimeFigureOut">
               <a:rPr lang="en-GB" smtClean="0"/>
-              <a:t>22/09/2020</a:t>
+              <a:t>17/12/2020</a:t>
             </a:fld>
             <a:endParaRPr lang="en-GB"/>
           </a:p>
@@ -2567,7 +2568,7 @@
           <a:p>
             <a:fld id="{9B1FE331-607A-41C5-B1B0-1D41A3BD8DBC}" type="datetimeFigureOut">
               <a:rPr lang="en-GB" smtClean="0"/>
-              <a:t>22/09/2020</a:t>
+              <a:t>17/12/2020</a:t>
             </a:fld>
             <a:endParaRPr lang="en-GB"/>
           </a:p>
@@ -3874,6 +3875,36 @@
           </a:p>
         </p:txBody>
       </p:sp>
+      <p:pic>
+        <p:nvPicPr>
+          <p:cNvPr id="22" name="Picture 21">
+            <a:extLst>
+              <a:ext uri="{FF2B5EF4-FFF2-40B4-BE49-F238E27FC236}">
+                <a16:creationId xmlns:a16="http://schemas.microsoft.com/office/drawing/2014/main" id="{25A63E43-6FFC-4E90-B28B-3F9E830E9EE7}"/>
+              </a:ext>
+            </a:extLst>
+          </p:cNvPr>
+          <p:cNvPicPr>
+            <a:picLocks noChangeAspect="1"/>
+          </p:cNvPicPr>
+          <p:nvPr/>
+        </p:nvPicPr>
+        <p:blipFill>
+          <a:blip r:embed="rId25"/>
+          <a:stretch>
+            <a:fillRect/>
+          </a:stretch>
+        </p:blipFill>
+        <p:spPr>
+          <a:xfrm>
+            <a:off x="4173893" y="13670902"/>
+            <a:ext cx="2180479" cy="1768145"/>
+          </a:xfrm>
+          <a:prstGeom prst="rect">
+            <a:avLst/>
+          </a:prstGeom>
+        </p:spPr>
+      </p:pic>
     </p:spTree>
     <p:extLst>
       <p:ext uri="{BB962C8B-B14F-4D97-AF65-F5344CB8AC3E}">
@@ -3968,6 +3999,246 @@
     <p:extLst>
       <p:ext uri="{BB962C8B-B14F-4D97-AF65-F5344CB8AC3E}">
         <p14:creationId xmlns:p14="http://schemas.microsoft.com/office/powerpoint/2010/main" val="1823953162"/>
+      </p:ext>
+    </p:extLst>
+  </p:cSld>
+  <p:clrMapOvr>
+    <a:masterClrMapping/>
+  </p:clrMapOvr>
+</p:sld>
+</file>
+
+<file path=ppt/slides/slide3.xml><?xml version="1.0" encoding="utf-8"?>
+<p:sld xmlns:a="http://schemas.openxmlformats.org/drawingml/2006/main" xmlns:r="http://schemas.openxmlformats.org/officeDocument/2006/relationships" xmlns:p="http://schemas.openxmlformats.org/presentationml/2006/main">
+  <p:cSld>
+    <p:spTree>
+      <p:nvGrpSpPr>
+        <p:cNvPr id="1" name=""/>
+        <p:cNvGrpSpPr/>
+        <p:nvPr/>
+      </p:nvGrpSpPr>
+      <p:grpSpPr>
+        <a:xfrm>
+          <a:off x="0" y="0"/>
+          <a:ext cx="0" cy="0"/>
+          <a:chOff x="0" y="0"/>
+          <a:chExt cx="0" cy="0"/>
+        </a:xfrm>
+      </p:grpSpPr>
+      <p:pic>
+        <p:nvPicPr>
+          <p:cNvPr id="5" name="Picture 4">
+            <a:extLst>
+              <a:ext uri="{FF2B5EF4-FFF2-40B4-BE49-F238E27FC236}">
+                <a16:creationId xmlns:a16="http://schemas.microsoft.com/office/drawing/2014/main" id="{1A42D105-3EEE-48C3-A54B-D28E7182B003}"/>
+              </a:ext>
+            </a:extLst>
+          </p:cNvPr>
+          <p:cNvPicPr>
+            <a:picLocks noChangeAspect="1"/>
+          </p:cNvPicPr>
+          <p:nvPr/>
+        </p:nvPicPr>
+        <p:blipFill>
+          <a:blip r:embed="rId2"/>
+          <a:stretch>
+            <a:fillRect/>
+          </a:stretch>
+        </p:blipFill>
+        <p:spPr>
+          <a:xfrm>
+            <a:off x="1896015" y="1655985"/>
+            <a:ext cx="2943225" cy="2143125"/>
+          </a:xfrm>
+          <a:prstGeom prst="rect">
+            <a:avLst/>
+          </a:prstGeom>
+        </p:spPr>
+      </p:pic>
+      <p:pic>
+        <p:nvPicPr>
+          <p:cNvPr id="7" name="Picture 6">
+            <a:extLst>
+              <a:ext uri="{FF2B5EF4-FFF2-40B4-BE49-F238E27FC236}">
+                <a16:creationId xmlns:a16="http://schemas.microsoft.com/office/drawing/2014/main" id="{C18828D1-FF1F-47C7-AA48-C6D5C42441D0}"/>
+              </a:ext>
+            </a:extLst>
+          </p:cNvPr>
+          <p:cNvPicPr>
+            <a:picLocks noChangeAspect="1"/>
+          </p:cNvPicPr>
+          <p:nvPr/>
+        </p:nvPicPr>
+        <p:blipFill>
+          <a:blip r:embed="rId3"/>
+          <a:stretch>
+            <a:fillRect/>
+          </a:stretch>
+        </p:blipFill>
+        <p:spPr>
+          <a:xfrm>
+            <a:off x="2143665" y="4848684"/>
+            <a:ext cx="2695575" cy="2143125"/>
+          </a:xfrm>
+          <a:prstGeom prst="rect">
+            <a:avLst/>
+          </a:prstGeom>
+        </p:spPr>
+      </p:pic>
+      <p:pic>
+        <p:nvPicPr>
+          <p:cNvPr id="9" name="Picture 8">
+            <a:extLst>
+              <a:ext uri="{FF2B5EF4-FFF2-40B4-BE49-F238E27FC236}">
+                <a16:creationId xmlns:a16="http://schemas.microsoft.com/office/drawing/2014/main" id="{B77BEC16-A3B2-4754-88D5-2180A2F9604E}"/>
+              </a:ext>
+            </a:extLst>
+          </p:cNvPr>
+          <p:cNvPicPr>
+            <a:picLocks noChangeAspect="1"/>
+          </p:cNvPicPr>
+          <p:nvPr/>
+        </p:nvPicPr>
+        <p:blipFill>
+          <a:blip r:embed="rId4"/>
+          <a:stretch>
+            <a:fillRect/>
+          </a:stretch>
+        </p:blipFill>
+        <p:spPr>
+          <a:xfrm>
+            <a:off x="2143665" y="7842582"/>
+            <a:ext cx="3762375" cy="2143125"/>
+          </a:xfrm>
+          <a:prstGeom prst="rect">
+            <a:avLst/>
+          </a:prstGeom>
+        </p:spPr>
+      </p:pic>
+      <p:pic>
+        <p:nvPicPr>
+          <p:cNvPr id="11" name="Picture 10">
+            <a:extLst>
+              <a:ext uri="{FF2B5EF4-FFF2-40B4-BE49-F238E27FC236}">
+                <a16:creationId xmlns:a16="http://schemas.microsoft.com/office/drawing/2014/main" id="{020C85E0-6F46-4696-8A30-4F9BAA2FE68B}"/>
+              </a:ext>
+            </a:extLst>
+          </p:cNvPr>
+          <p:cNvPicPr>
+            <a:picLocks noChangeAspect="1"/>
+          </p:cNvPicPr>
+          <p:nvPr/>
+        </p:nvPicPr>
+        <p:blipFill>
+          <a:blip r:embed="rId5"/>
+          <a:stretch>
+            <a:fillRect/>
+          </a:stretch>
+        </p:blipFill>
+        <p:spPr>
+          <a:xfrm>
+            <a:off x="7218457" y="7928768"/>
+            <a:ext cx="3505200" cy="2143125"/>
+          </a:xfrm>
+          <a:prstGeom prst="rect">
+            <a:avLst/>
+          </a:prstGeom>
+        </p:spPr>
+      </p:pic>
+      <p:pic>
+        <p:nvPicPr>
+          <p:cNvPr id="13" name="Picture 12">
+            <a:extLst>
+              <a:ext uri="{FF2B5EF4-FFF2-40B4-BE49-F238E27FC236}">
+                <a16:creationId xmlns:a16="http://schemas.microsoft.com/office/drawing/2014/main" id="{306B5F53-2058-4BD2-8623-11E80F362357}"/>
+              </a:ext>
+            </a:extLst>
+          </p:cNvPr>
+          <p:cNvPicPr>
+            <a:picLocks noChangeAspect="1"/>
+          </p:cNvPicPr>
+          <p:nvPr/>
+        </p:nvPicPr>
+        <p:blipFill>
+          <a:blip r:embed="rId6"/>
+          <a:stretch>
+            <a:fillRect/>
+          </a:stretch>
+        </p:blipFill>
+        <p:spPr>
+          <a:xfrm>
+            <a:off x="7218457" y="4281837"/>
+            <a:ext cx="2686050" cy="2143125"/>
+          </a:xfrm>
+          <a:prstGeom prst="rect">
+            <a:avLst/>
+          </a:prstGeom>
+        </p:spPr>
+      </p:pic>
+      <p:pic>
+        <p:nvPicPr>
+          <p:cNvPr id="15" name="Picture 14">
+            <a:extLst>
+              <a:ext uri="{FF2B5EF4-FFF2-40B4-BE49-F238E27FC236}">
+                <a16:creationId xmlns:a16="http://schemas.microsoft.com/office/drawing/2014/main" id="{07E47BE4-1C48-486F-AAEE-454A3182FD6A}"/>
+              </a:ext>
+            </a:extLst>
+          </p:cNvPr>
+          <p:cNvPicPr>
+            <a:picLocks noChangeAspect="1"/>
+          </p:cNvPicPr>
+          <p:nvPr/>
+        </p:nvPicPr>
+        <p:blipFill>
+          <a:blip r:embed="rId7"/>
+          <a:stretch>
+            <a:fillRect/>
+          </a:stretch>
+        </p:blipFill>
+        <p:spPr>
+          <a:xfrm>
+            <a:off x="7147766" y="1655985"/>
+            <a:ext cx="2952750" cy="2143125"/>
+          </a:xfrm>
+          <a:prstGeom prst="rect">
+            <a:avLst/>
+          </a:prstGeom>
+        </p:spPr>
+      </p:pic>
+      <p:pic>
+        <p:nvPicPr>
+          <p:cNvPr id="17" name="Picture 16">
+            <a:extLst>
+              <a:ext uri="{FF2B5EF4-FFF2-40B4-BE49-F238E27FC236}">
+                <a16:creationId xmlns:a16="http://schemas.microsoft.com/office/drawing/2014/main" id="{BDBC144F-0BBF-42B1-85D4-18869F91509D}"/>
+              </a:ext>
+            </a:extLst>
+          </p:cNvPr>
+          <p:cNvPicPr>
+            <a:picLocks noChangeAspect="1"/>
+          </p:cNvPicPr>
+          <p:nvPr/>
+        </p:nvPicPr>
+        <p:blipFill>
+          <a:blip r:embed="rId8"/>
+          <a:stretch>
+            <a:fillRect/>
+          </a:stretch>
+        </p:blipFill>
+        <p:spPr>
+          <a:xfrm>
+            <a:off x="7491571" y="6907689"/>
+            <a:ext cx="609600" cy="390525"/>
+          </a:xfrm>
+          <a:prstGeom prst="rect">
+            <a:avLst/>
+          </a:prstGeom>
+        </p:spPr>
+      </p:pic>
+    </p:spTree>
+    <p:extLst>
+      <p:ext uri="{BB962C8B-B14F-4D97-AF65-F5344CB8AC3E}">
+        <p14:creationId xmlns:p14="http://schemas.microsoft.com/office/powerpoint/2010/main" val="3723145240"/>
       </p:ext>
     </p:extLst>
   </p:cSld>

</xml_diff>

<commit_message>
Activities Int vs Ext
</commit_message>
<xml_diff>
--- a/docs/Images.pptx
+++ b/docs/Images.pptx
@@ -245,7 +245,7 @@
           <a:p>
             <a:fld id="{9B1FE331-607A-41C5-B1B0-1D41A3BD8DBC}" type="datetimeFigureOut">
               <a:rPr lang="en-GB" smtClean="0"/>
-              <a:t>17/12/2020</a:t>
+              <a:t>23/07/2021</a:t>
             </a:fld>
             <a:endParaRPr lang="en-GB"/>
           </a:p>
@@ -415,7 +415,7 @@
           <a:p>
             <a:fld id="{9B1FE331-607A-41C5-B1B0-1D41A3BD8DBC}" type="datetimeFigureOut">
               <a:rPr lang="en-GB" smtClean="0"/>
-              <a:t>17/12/2020</a:t>
+              <a:t>23/07/2021</a:t>
             </a:fld>
             <a:endParaRPr lang="en-GB"/>
           </a:p>
@@ -595,7 +595,7 @@
           <a:p>
             <a:fld id="{9B1FE331-607A-41C5-B1B0-1D41A3BD8DBC}" type="datetimeFigureOut">
               <a:rPr lang="en-GB" smtClean="0"/>
-              <a:t>17/12/2020</a:t>
+              <a:t>23/07/2021</a:t>
             </a:fld>
             <a:endParaRPr lang="en-GB"/>
           </a:p>
@@ -765,7 +765,7 @@
           <a:p>
             <a:fld id="{9B1FE331-607A-41C5-B1B0-1D41A3BD8DBC}" type="datetimeFigureOut">
               <a:rPr lang="en-GB" smtClean="0"/>
-              <a:t>17/12/2020</a:t>
+              <a:t>23/07/2021</a:t>
             </a:fld>
             <a:endParaRPr lang="en-GB"/>
           </a:p>
@@ -1009,7 +1009,7 @@
           <a:p>
             <a:fld id="{9B1FE331-607A-41C5-B1B0-1D41A3BD8DBC}" type="datetimeFigureOut">
               <a:rPr lang="en-GB" smtClean="0"/>
-              <a:t>17/12/2020</a:t>
+              <a:t>23/07/2021</a:t>
             </a:fld>
             <a:endParaRPr lang="en-GB"/>
           </a:p>
@@ -1241,7 +1241,7 @@
           <a:p>
             <a:fld id="{9B1FE331-607A-41C5-B1B0-1D41A3BD8DBC}" type="datetimeFigureOut">
               <a:rPr lang="en-GB" smtClean="0"/>
-              <a:t>17/12/2020</a:t>
+              <a:t>23/07/2021</a:t>
             </a:fld>
             <a:endParaRPr lang="en-GB"/>
           </a:p>
@@ -1608,7 +1608,7 @@
           <a:p>
             <a:fld id="{9B1FE331-607A-41C5-B1B0-1D41A3BD8DBC}" type="datetimeFigureOut">
               <a:rPr lang="en-GB" smtClean="0"/>
-              <a:t>17/12/2020</a:t>
+              <a:t>23/07/2021</a:t>
             </a:fld>
             <a:endParaRPr lang="en-GB"/>
           </a:p>
@@ -1726,7 +1726,7 @@
           <a:p>
             <a:fld id="{9B1FE331-607A-41C5-B1B0-1D41A3BD8DBC}" type="datetimeFigureOut">
               <a:rPr lang="en-GB" smtClean="0"/>
-              <a:t>17/12/2020</a:t>
+              <a:t>23/07/2021</a:t>
             </a:fld>
             <a:endParaRPr lang="en-GB"/>
           </a:p>
@@ -1821,7 +1821,7 @@
           <a:p>
             <a:fld id="{9B1FE331-607A-41C5-B1B0-1D41A3BD8DBC}" type="datetimeFigureOut">
               <a:rPr lang="en-GB" smtClean="0"/>
-              <a:t>17/12/2020</a:t>
+              <a:t>23/07/2021</a:t>
             </a:fld>
             <a:endParaRPr lang="en-GB"/>
           </a:p>
@@ -2098,7 +2098,7 @@
           <a:p>
             <a:fld id="{9B1FE331-607A-41C5-B1B0-1D41A3BD8DBC}" type="datetimeFigureOut">
               <a:rPr lang="en-GB" smtClean="0"/>
-              <a:t>17/12/2020</a:t>
+              <a:t>23/07/2021</a:t>
             </a:fld>
             <a:endParaRPr lang="en-GB"/>
           </a:p>
@@ -2355,7 +2355,7 @@
           <a:p>
             <a:fld id="{9B1FE331-607A-41C5-B1B0-1D41A3BD8DBC}" type="datetimeFigureOut">
               <a:rPr lang="en-GB" smtClean="0"/>
-              <a:t>17/12/2020</a:t>
+              <a:t>23/07/2021</a:t>
             </a:fld>
             <a:endParaRPr lang="en-GB"/>
           </a:p>
@@ -2568,7 +2568,7 @@
           <a:p>
             <a:fld id="{9B1FE331-607A-41C5-B1B0-1D41A3BD8DBC}" type="datetimeFigureOut">
               <a:rPr lang="en-GB" smtClean="0"/>
-              <a:t>17/12/2020</a:t>
+              <a:t>23/07/2021</a:t>
             </a:fld>
             <a:endParaRPr lang="en-GB"/>
           </a:p>

</xml_diff>